<commit_message>
Added slide for GoldenGate
</commit_message>
<xml_diff>
--- a/Kafka and Oracle.pptx
+++ b/Kafka and Oracle.pptx
@@ -7,12 +7,13 @@
   <p:sldIdLst>
     <p:sldId id="256" r:id="rId5"/>
     <p:sldId id="257" r:id="rId6"/>
-    <p:sldId id="263" r:id="rId7"/>
-    <p:sldId id="262" r:id="rId8"/>
-    <p:sldId id="261" r:id="rId9"/>
-    <p:sldId id="258" r:id="rId10"/>
-    <p:sldId id="259" r:id="rId11"/>
-    <p:sldId id="260" r:id="rId12"/>
+    <p:sldId id="264" r:id="rId7"/>
+    <p:sldId id="263" r:id="rId8"/>
+    <p:sldId id="262" r:id="rId9"/>
+    <p:sldId id="261" r:id="rId10"/>
+    <p:sldId id="258" r:id="rId11"/>
+    <p:sldId id="259" r:id="rId12"/>
+    <p:sldId id="260" r:id="rId13"/>
   </p:sldIdLst>
   <p:sldSz cx="17340263" cy="9753600"/>
   <p:notesSz cx="6858000" cy="9144000"/>
@@ -21497,6 +21498,94 @@
         </p:blipFill>
         <p:spPr>
           <a:xfrm>
+            <a:off x="4216400" y="1780456"/>
+            <a:ext cx="8905875" cy="7848600"/>
+          </a:xfrm>
+          <a:prstGeom prst="rect">
+            <a:avLst/>
+          </a:prstGeom>
+        </p:spPr>
+      </p:pic>
+    </p:spTree>
+    <p:extLst>
+      <p:ext uri="{BB962C8B-B14F-4D97-AF65-F5344CB8AC3E}">
+        <p14:creationId xmlns:p14="http://schemas.microsoft.com/office/powerpoint/2010/main" val="897271775"/>
+      </p:ext>
+    </p:extLst>
+  </p:cSld>
+  <p:clrMapOvr>
+    <a:masterClrMapping/>
+  </p:clrMapOvr>
+</p:sld>
+</file>
+
+<file path=ppt/slides/slide4.xml><?xml version="1.0" encoding="utf-8"?>
+<p:sld xmlns:a="http://schemas.openxmlformats.org/drawingml/2006/main" xmlns:r="http://schemas.openxmlformats.org/officeDocument/2006/relationships" xmlns:p="http://schemas.openxmlformats.org/presentationml/2006/main">
+  <p:cSld>
+    <p:spTree>
+      <p:nvGrpSpPr>
+        <p:cNvPr id="1" name=""/>
+        <p:cNvGrpSpPr/>
+        <p:nvPr/>
+      </p:nvGrpSpPr>
+      <p:grpSpPr>
+        <a:xfrm>
+          <a:off x="0" y="0"/>
+          <a:ext cx="0" cy="0"/>
+          <a:chOff x="0" y="0"/>
+          <a:chExt cx="0" cy="0"/>
+        </a:xfrm>
+      </p:grpSpPr>
+      <p:sp>
+        <p:nvSpPr>
+          <p:cNvPr id="2" name="Titel 1"/>
+          <p:cNvSpPr>
+            <a:spLocks noGrp="1"/>
+          </p:cNvSpPr>
+          <p:nvPr>
+            <p:ph type="title"/>
+          </p:nvPr>
+        </p:nvSpPr>
+        <p:spPr/>
+        <p:txBody>
+          <a:bodyPr/>
+          <a:lstStyle/>
+          <a:p>
+            <a:r>
+              <a:rPr lang="nl-NL" dirty="0" err="1"/>
+              <a:t>GoldenGate</a:t>
+            </a:r>
+            <a:r>
+              <a:rPr lang="nl-NL" dirty="0"/>
+              <a:t> </a:t>
+            </a:r>
+            <a:r>
+              <a:rPr lang="nl-NL" dirty="0" err="1"/>
+              <a:t>for</a:t>
+            </a:r>
+            <a:r>
+              <a:rPr lang="nl-NL" dirty="0"/>
+              <a:t> Big Data</a:t>
+            </a:r>
+          </a:p>
+        </p:txBody>
+      </p:sp>
+      <p:pic>
+        <p:nvPicPr>
+          <p:cNvPr id="4" name="Afbeelding 3"/>
+          <p:cNvPicPr>
+            <a:picLocks noChangeAspect="1"/>
+          </p:cNvPicPr>
+          <p:nvPr/>
+        </p:nvPicPr>
+        <p:blipFill>
+          <a:blip r:embed="rId2"/>
+          <a:stretch>
+            <a:fillRect/>
+          </a:stretch>
+        </p:blipFill>
+        <p:spPr>
+          <a:xfrm>
             <a:off x="1613347" y="1636440"/>
             <a:ext cx="12086104" cy="7113767"/>
           </a:xfrm>
@@ -21564,7 +21653,7 @@
 </p:sld>
 </file>
 
-<file path=ppt/slides/slide4.xml><?xml version="1.0" encoding="utf-8"?>
+<file path=ppt/slides/slide5.xml><?xml version="1.0" encoding="utf-8"?>
 <p:sld xmlns:a="http://schemas.openxmlformats.org/drawingml/2006/main" xmlns:r="http://schemas.openxmlformats.org/officeDocument/2006/relationships" xmlns:p="http://schemas.openxmlformats.org/presentationml/2006/main">
   <p:cSld>
     <p:spTree>
@@ -21649,99 +21738,6 @@
     <p:extLst>
       <p:ext uri="{BB962C8B-B14F-4D97-AF65-F5344CB8AC3E}">
         <p14:creationId xmlns:p14="http://schemas.microsoft.com/office/powerpoint/2010/main" val="3449038594"/>
-      </p:ext>
-    </p:extLst>
-  </p:cSld>
-  <p:clrMapOvr>
-    <a:masterClrMapping/>
-  </p:clrMapOvr>
-</p:sld>
-</file>
-
-<file path=ppt/slides/slide5.xml><?xml version="1.0" encoding="utf-8"?>
-<p:sld xmlns:a="http://schemas.openxmlformats.org/drawingml/2006/main" xmlns:r="http://schemas.openxmlformats.org/officeDocument/2006/relationships" xmlns:p="http://schemas.openxmlformats.org/presentationml/2006/main">
-  <p:cSld>
-    <p:spTree>
-      <p:nvGrpSpPr>
-        <p:cNvPr id="1" name=""/>
-        <p:cNvGrpSpPr/>
-        <p:nvPr/>
-      </p:nvGrpSpPr>
-      <p:grpSpPr>
-        <a:xfrm>
-          <a:off x="0" y="0"/>
-          <a:ext cx="0" cy="0"/>
-          <a:chOff x="0" y="0"/>
-          <a:chExt cx="0" cy="0"/>
-        </a:xfrm>
-      </p:grpSpPr>
-      <p:sp>
-        <p:nvSpPr>
-          <p:cNvPr id="2" name="Titel 1"/>
-          <p:cNvSpPr>
-            <a:spLocks noGrp="1"/>
-          </p:cNvSpPr>
-          <p:nvPr>
-            <p:ph type="title"/>
-          </p:nvPr>
-        </p:nvSpPr>
-        <p:spPr/>
-        <p:txBody>
-          <a:bodyPr/>
-          <a:lstStyle/>
-          <a:p>
-            <a:r>
-              <a:rPr lang="en-US" dirty="0"/>
-              <a:t>Elastic Big Data &amp; Streaming platform</a:t>
-            </a:r>
-          </a:p>
-        </p:txBody>
-      </p:sp>
-      <p:pic>
-        <p:nvPicPr>
-          <p:cNvPr id="2050" name="Picture 2" descr="2016-09-27_20-09-39"/>
-          <p:cNvPicPr>
-            <a:picLocks noChangeAspect="1" noChangeArrowheads="1"/>
-          </p:cNvPicPr>
-          <p:nvPr/>
-        </p:nvPicPr>
-        <p:blipFill>
-          <a:blip r:embed="rId2">
-            <a:extLst>
-              <a:ext uri="{28A0092B-C50C-407E-A947-70E740481C1C}">
-                <a14:useLocalDpi xmlns:a14="http://schemas.microsoft.com/office/drawing/2010/main" val="0"/>
-              </a:ext>
-            </a:extLst>
-          </a:blip>
-          <a:srcRect/>
-          <a:stretch>
-            <a:fillRect/>
-          </a:stretch>
-        </p:blipFill>
-        <p:spPr bwMode="auto">
-          <a:xfrm>
-            <a:off x="3269531" y="1708448"/>
-            <a:ext cx="10441160" cy="7926902"/>
-          </a:xfrm>
-          <a:prstGeom prst="rect">
-            <a:avLst/>
-          </a:prstGeom>
-          <a:noFill/>
-          <a:extLst>
-            <a:ext uri="{909E8E84-426E-40DD-AFC4-6F175D3DCCD1}">
-              <a14:hiddenFill xmlns:a14="http://schemas.microsoft.com/office/drawing/2010/main">
-                <a:solidFill>
-                  <a:srgbClr val="FFFFFF"/>
-                </a:solidFill>
-              </a14:hiddenFill>
-            </a:ext>
-          </a:extLst>
-        </p:spPr>
-      </p:pic>
-    </p:spTree>
-    <p:extLst>
-      <p:ext uri="{BB962C8B-B14F-4D97-AF65-F5344CB8AC3E}">
-        <p14:creationId xmlns:p14="http://schemas.microsoft.com/office/powerpoint/2010/main" val="175180800"/>
       </p:ext>
     </p:extLst>
   </p:cSld>
@@ -21784,6 +21780,99 @@
           <a:lstStyle/>
           <a:p>
             <a:r>
+              <a:rPr lang="en-US" dirty="0"/>
+              <a:t>Elastic Big Data &amp; Streaming platform</a:t>
+            </a:r>
+          </a:p>
+        </p:txBody>
+      </p:sp>
+      <p:pic>
+        <p:nvPicPr>
+          <p:cNvPr id="2050" name="Picture 2" descr="2016-09-27_20-09-39"/>
+          <p:cNvPicPr>
+            <a:picLocks noChangeAspect="1" noChangeArrowheads="1"/>
+          </p:cNvPicPr>
+          <p:nvPr/>
+        </p:nvPicPr>
+        <p:blipFill>
+          <a:blip r:embed="rId2">
+            <a:extLst>
+              <a:ext uri="{28A0092B-C50C-407E-A947-70E740481C1C}">
+                <a14:useLocalDpi xmlns:a14="http://schemas.microsoft.com/office/drawing/2010/main" val="0"/>
+              </a:ext>
+            </a:extLst>
+          </a:blip>
+          <a:srcRect/>
+          <a:stretch>
+            <a:fillRect/>
+          </a:stretch>
+        </p:blipFill>
+        <p:spPr bwMode="auto">
+          <a:xfrm>
+            <a:off x="3269531" y="1708448"/>
+            <a:ext cx="10441160" cy="7926902"/>
+          </a:xfrm>
+          <a:prstGeom prst="rect">
+            <a:avLst/>
+          </a:prstGeom>
+          <a:noFill/>
+          <a:extLst>
+            <a:ext uri="{909E8E84-426E-40DD-AFC4-6F175D3DCCD1}">
+              <a14:hiddenFill xmlns:a14="http://schemas.microsoft.com/office/drawing/2010/main">
+                <a:solidFill>
+                  <a:srgbClr val="FFFFFF"/>
+                </a:solidFill>
+              </a14:hiddenFill>
+            </a:ext>
+          </a:extLst>
+        </p:spPr>
+      </p:pic>
+    </p:spTree>
+    <p:extLst>
+      <p:ext uri="{BB962C8B-B14F-4D97-AF65-F5344CB8AC3E}">
+        <p14:creationId xmlns:p14="http://schemas.microsoft.com/office/powerpoint/2010/main" val="175180800"/>
+      </p:ext>
+    </p:extLst>
+  </p:cSld>
+  <p:clrMapOvr>
+    <a:masterClrMapping/>
+  </p:clrMapOvr>
+</p:sld>
+</file>
+
+<file path=ppt/slides/slide7.xml><?xml version="1.0" encoding="utf-8"?>
+<p:sld xmlns:a="http://schemas.openxmlformats.org/drawingml/2006/main" xmlns:r="http://schemas.openxmlformats.org/officeDocument/2006/relationships" xmlns:p="http://schemas.openxmlformats.org/presentationml/2006/main">
+  <p:cSld>
+    <p:spTree>
+      <p:nvGrpSpPr>
+        <p:cNvPr id="1" name=""/>
+        <p:cNvGrpSpPr/>
+        <p:nvPr/>
+      </p:nvGrpSpPr>
+      <p:grpSpPr>
+        <a:xfrm>
+          <a:off x="0" y="0"/>
+          <a:ext cx="0" cy="0"/>
+          <a:chOff x="0" y="0"/>
+          <a:chExt cx="0" cy="0"/>
+        </a:xfrm>
+      </p:grpSpPr>
+      <p:sp>
+        <p:nvSpPr>
+          <p:cNvPr id="2" name="Titel 1"/>
+          <p:cNvSpPr>
+            <a:spLocks noGrp="1"/>
+          </p:cNvSpPr>
+          <p:nvPr>
+            <p:ph type="title"/>
+          </p:nvPr>
+        </p:nvSpPr>
+        <p:spPr/>
+        <p:txBody>
+          <a:bodyPr/>
+          <a:lstStyle/>
+          <a:p>
+            <a:r>
               <a:rPr lang="nl-NL" dirty="0" smtClean="0"/>
               <a:t>Event Hub</a:t>
             </a:r>
@@ -21828,7 +21917,7 @@
 </p:sld>
 </file>
 
-<file path=ppt/slides/slide7.xml><?xml version="1.0" encoding="utf-8"?>
+<file path=ppt/slides/slide8.xml><?xml version="1.0" encoding="utf-8"?>
 <p:sld xmlns:a="http://schemas.openxmlformats.org/drawingml/2006/main" xmlns:r="http://schemas.openxmlformats.org/officeDocument/2006/relationships" xmlns:p="http://schemas.openxmlformats.org/presentationml/2006/main">
   <p:cSld>
     <p:spTree>
@@ -21905,7 +21994,7 @@
 </p:sld>
 </file>
 
-<file path=ppt/slides/slide8.xml><?xml version="1.0" encoding="utf-8"?>
+<file path=ppt/slides/slide9.xml><?xml version="1.0" encoding="utf-8"?>
 <p:sld xmlns:a="http://schemas.openxmlformats.org/drawingml/2006/main" xmlns:r="http://schemas.openxmlformats.org/officeDocument/2006/relationships" xmlns:p="http://schemas.openxmlformats.org/presentationml/2006/main">
   <p:cSld>
     <p:spTree>
@@ -22215,13 +22304,12 @@
 </file>
 
 <file path=customXml/item1.xml><?xml version="1.0" encoding="utf-8"?>
-<p:properties xmlns:p="http://schemas.microsoft.com/office/2006/metadata/properties" xmlns:xsi="http://www.w3.org/2001/XMLSchema-instance" xmlns:pc="http://schemas.microsoft.com/office/infopath/2007/PartnerControls">
-  <documentManagement>
-    <Categorie xmlns="ff60f657-0a02-4a8f-9d33-32b65509cec9" xsi:nil="true"/>
-    <PublishingExpirationDate xmlns="http://schemas.microsoft.com/sharepoint/v3" xsi:nil="true"/>
-    <PublishingStartDate xmlns="http://schemas.microsoft.com/sharepoint/v3" xsi:nil="true"/>
-  </documentManagement>
-</p:properties>
+<?mso-contentType ?>
+<FormTemplates xmlns="http://schemas.microsoft.com/sharepoint/v3/contenttype/forms">
+  <Display>DocumentLibraryForm</Display>
+  <Edit>DocumentLibraryForm</Edit>
+  <New>DocumentLibraryForm</New>
+</FormTemplates>
 </file>
 
 <file path=customXml/item2.xml><?xml version="1.0" encoding="utf-8"?>
@@ -22370,27 +22458,19 @@
 </file>
 
 <file path=customXml/item3.xml><?xml version="1.0" encoding="utf-8"?>
-<?mso-contentType ?>
-<FormTemplates xmlns="http://schemas.microsoft.com/sharepoint/v3/contenttype/forms">
-  <Display>DocumentLibraryForm</Display>
-  <Edit>DocumentLibraryForm</Edit>
-  <New>DocumentLibraryForm</New>
-</FormTemplates>
+<p:properties xmlns:p="http://schemas.microsoft.com/office/2006/metadata/properties" xmlns:xsi="http://www.w3.org/2001/XMLSchema-instance" xmlns:pc="http://schemas.microsoft.com/office/infopath/2007/PartnerControls">
+  <documentManagement>
+    <Categorie xmlns="ff60f657-0a02-4a8f-9d33-32b65509cec9" xsi:nil="true"/>
+    <PublishingExpirationDate xmlns="http://schemas.microsoft.com/sharepoint/v3" xsi:nil="true"/>
+    <PublishingStartDate xmlns="http://schemas.microsoft.com/sharepoint/v3" xsi:nil="true"/>
+  </documentManagement>
+</p:properties>
 </file>
 
 <file path=customXml/itemProps1.xml><?xml version="1.0" encoding="utf-8"?>
-<ds:datastoreItem xmlns:ds="http://schemas.openxmlformats.org/officeDocument/2006/customXml" ds:itemID="{BFE0D8CD-30E1-4C48-A60F-09D673157CF5}">
+<ds:datastoreItem xmlns:ds="http://schemas.openxmlformats.org/officeDocument/2006/customXml" ds:itemID="{410DEB70-8030-4411-833B-69ECD5FB0CE0}">
   <ds:schemaRefs>
-    <ds:schemaRef ds:uri="http://purl.org/dc/elements/1.1/"/>
-    <ds:schemaRef ds:uri="ff60f657-0a02-4a8f-9d33-32b65509cec9"/>
-    <ds:schemaRef ds:uri="http://schemas.microsoft.com/office/2006/documentManagement/types"/>
-    <ds:schemaRef ds:uri="http://schemas.microsoft.com/office/infopath/2007/PartnerControls"/>
-    <ds:schemaRef ds:uri="http://www.w3.org/XML/1998/namespace"/>
-    <ds:schemaRef ds:uri="http://purl.org/dc/terms/"/>
-    <ds:schemaRef ds:uri="http://schemas.openxmlformats.org/package/2006/metadata/core-properties"/>
-    <ds:schemaRef ds:uri="http://schemas.microsoft.com/sharepoint/v3"/>
-    <ds:schemaRef ds:uri="http://schemas.microsoft.com/office/2006/metadata/properties"/>
-    <ds:schemaRef ds:uri="http://purl.org/dc/dcmitype/"/>
+    <ds:schemaRef ds:uri="http://schemas.microsoft.com/sharepoint/v3/contenttype/forms"/>
   </ds:schemaRefs>
 </ds:datastoreItem>
 </file>
@@ -22415,9 +22495,18 @@
 </file>
 
 <file path=customXml/itemProps3.xml><?xml version="1.0" encoding="utf-8"?>
-<ds:datastoreItem xmlns:ds="http://schemas.openxmlformats.org/officeDocument/2006/customXml" ds:itemID="{410DEB70-8030-4411-833B-69ECD5FB0CE0}">
+<ds:datastoreItem xmlns:ds="http://schemas.openxmlformats.org/officeDocument/2006/customXml" ds:itemID="{BFE0D8CD-30E1-4C48-A60F-09D673157CF5}">
   <ds:schemaRefs>
-    <ds:schemaRef ds:uri="http://schemas.microsoft.com/sharepoint/v3/contenttype/forms"/>
+    <ds:schemaRef ds:uri="http://purl.org/dc/elements/1.1/"/>
+    <ds:schemaRef ds:uri="ff60f657-0a02-4a8f-9d33-32b65509cec9"/>
+    <ds:schemaRef ds:uri="http://schemas.microsoft.com/office/2006/documentManagement/types"/>
+    <ds:schemaRef ds:uri="http://schemas.microsoft.com/office/infopath/2007/PartnerControls"/>
+    <ds:schemaRef ds:uri="http://www.w3.org/XML/1998/namespace"/>
+    <ds:schemaRef ds:uri="http://purl.org/dc/terms/"/>
+    <ds:schemaRef ds:uri="http://schemas.openxmlformats.org/package/2006/metadata/core-properties"/>
+    <ds:schemaRef ds:uri="http://schemas.microsoft.com/sharepoint/v3"/>
+    <ds:schemaRef ds:uri="http://schemas.microsoft.com/office/2006/metadata/properties"/>
+    <ds:schemaRef ds:uri="http://purl.org/dc/dcmitype/"/>
   </ds:schemaRefs>
 </ds:datastoreItem>
 </file>
</xml_diff>